<commit_message>
layout verloren plus win hinzugefügt
</commit_message>
<xml_diff>
--- a/battleship-android/Softwareprojekt_präsi.pptx
+++ b/battleship-android/Softwareprojekt_präsi.pptx
@@ -5,7 +5,7 @@
     <p:sldMasterId id="2147483648" r:id="rId2"/>
   </p:sldMasterIdLst>
   <p:notesMasterIdLst>
-    <p:notesMasterId r:id="rId9"/>
+    <p:notesMasterId r:id="rId11"/>
   </p:notesMasterIdLst>
   <p:sldIdLst>
     <p:sldId id="256" r:id="rId3"/>
@@ -14,6 +14,8 @@
     <p:sldId id="260" r:id="rId6"/>
     <p:sldId id="262" r:id="rId7"/>
     <p:sldId id="263" r:id="rId8"/>
+    <p:sldId id="264" r:id="rId9"/>
+    <p:sldId id="265" r:id="rId10"/>
   </p:sldIdLst>
   <p:sldSz cx="9144000" cy="5143500" type="screen16x9"/>
   <p:notesSz cx="6858000" cy="9144000"/>
@@ -127,322 +129,6 @@
     </p:ext>
   </p:extLst>
 </p:presentation>
-</file>
-
-<file path=ppt/charts/chart1.xml><?xml version="1.0" encoding="utf-8"?>
-<c:chartSpace xmlns:c="http://schemas.openxmlformats.org/drawingml/2006/chart" xmlns:a="http://schemas.openxmlformats.org/drawingml/2006/main" xmlns:r="http://schemas.openxmlformats.org/officeDocument/2006/relationships">
-  <c:date1904 val="1"/>
-  <c:lang val="de-DE"/>
-  <c:roundedCorners val="1"/>
-  <c:style val="1"/>
-  <c:chart>
-    <c:autoTitleDeleted val="1"/>
-    <c:plotArea>
-      <c:layout/>
-      <c:barChart>
-        <c:barDir val="col"/>
-        <c:grouping val="clustered"/>
-        <c:varyColors val="1"/>
-        <c:ser>
-          <c:idx val="0"/>
-          <c:order val="0"/>
-          <c:tx>
-            <c:strRef>
-              <c:f>Blatt1!$B$1</c:f>
-              <c:strCache>
-                <c:ptCount val="1"/>
-                <c:pt idx="0">
-                  <c:v>Ost</c:v>
-                </c:pt>
-              </c:strCache>
-            </c:strRef>
-          </c:tx>
-          <c:invertIfNegative val="1"/>
-          <c:dLbls>
-            <c:numFmt formatCode="General" sourceLinked="0"/>
-            <c:spPr>
-              <a:noFill/>
-              <a:ln>
-                <a:noFill/>
-              </a:ln>
-              <a:effectLst/>
-            </c:spPr>
-            <c:showLegendKey val="1"/>
-            <c:showVal val="1"/>
-            <c:showCatName val="1"/>
-            <c:showSerName val="1"/>
-            <c:showPercent val="1"/>
-            <c:showBubbleSize val="1"/>
-            <c:showLeaderLines val="0"/>
-            <c:extLst>
-              <c:ext xmlns:c15="http://schemas.microsoft.com/office/drawing/2012/chart" uri="{CE6537A1-D6FC-4f65-9D91-7224C49458BB}">
-                <c15:layout/>
-                <c15:showLeaderLines val="0"/>
-              </c:ext>
-            </c:extLst>
-          </c:dLbls>
-          <c:cat>
-            <c:strRef>
-              <c:f>Blatt1!$A$2:$A$5</c:f>
-              <c:strCache>
-                <c:ptCount val="4"/>
-                <c:pt idx="0">
-                  <c:v>1. Qrtl.</c:v>
-                </c:pt>
-                <c:pt idx="1">
-                  <c:v>2. Qrtl.</c:v>
-                </c:pt>
-                <c:pt idx="2">
-                  <c:v>3. Qrtl.</c:v>
-                </c:pt>
-                <c:pt idx="3">
-                  <c:v>4. Qrtl.</c:v>
-                </c:pt>
-              </c:strCache>
-            </c:strRef>
-          </c:cat>
-          <c:val>
-            <c:numRef>
-              <c:f>Blatt1!$B$2:$B$5</c:f>
-              <c:numCache>
-                <c:formatCode>General</c:formatCode>
-                <c:ptCount val="4"/>
-                <c:pt idx="0">
-                  <c:v>20.399999999999999</c:v>
-                </c:pt>
-                <c:pt idx="1">
-                  <c:v>27.4</c:v>
-                </c:pt>
-                <c:pt idx="2">
-                  <c:v>90</c:v>
-                </c:pt>
-                <c:pt idx="3">
-                  <c:v>20.399999999999999</c:v>
-                </c:pt>
-              </c:numCache>
-            </c:numRef>
-          </c:val>
-        </c:ser>
-        <c:ser>
-          <c:idx val="1"/>
-          <c:order val="1"/>
-          <c:tx>
-            <c:strRef>
-              <c:f>Blatt1!$C$1</c:f>
-              <c:strCache>
-                <c:ptCount val="1"/>
-                <c:pt idx="0">
-                  <c:v>West</c:v>
-                </c:pt>
-              </c:strCache>
-            </c:strRef>
-          </c:tx>
-          <c:invertIfNegative val="1"/>
-          <c:dLbls>
-            <c:numFmt formatCode="General" sourceLinked="0"/>
-            <c:spPr>
-              <a:noFill/>
-              <a:ln>
-                <a:noFill/>
-              </a:ln>
-              <a:effectLst/>
-            </c:spPr>
-            <c:showLegendKey val="1"/>
-            <c:showVal val="1"/>
-            <c:showCatName val="1"/>
-            <c:showSerName val="1"/>
-            <c:showPercent val="1"/>
-            <c:showBubbleSize val="1"/>
-            <c:showLeaderLines val="0"/>
-            <c:extLst>
-              <c:ext xmlns:c15="http://schemas.microsoft.com/office/drawing/2012/chart" uri="{CE6537A1-D6FC-4f65-9D91-7224C49458BB}">
-                <c15:layout/>
-                <c15:showLeaderLines val="0"/>
-              </c:ext>
-            </c:extLst>
-          </c:dLbls>
-          <c:cat>
-            <c:strRef>
-              <c:f>Blatt1!$A$2:$A$5</c:f>
-              <c:strCache>
-                <c:ptCount val="4"/>
-                <c:pt idx="0">
-                  <c:v>1. Qrtl.</c:v>
-                </c:pt>
-                <c:pt idx="1">
-                  <c:v>2. Qrtl.</c:v>
-                </c:pt>
-                <c:pt idx="2">
-                  <c:v>3. Qrtl.</c:v>
-                </c:pt>
-                <c:pt idx="3">
-                  <c:v>4. Qrtl.</c:v>
-                </c:pt>
-              </c:strCache>
-            </c:strRef>
-          </c:cat>
-          <c:val>
-            <c:numRef>
-              <c:f>Blatt1!$C$2:$C$5</c:f>
-              <c:numCache>
-                <c:formatCode>General</c:formatCode>
-                <c:ptCount val="4"/>
-                <c:pt idx="0">
-                  <c:v>30.6</c:v>
-                </c:pt>
-                <c:pt idx="1">
-                  <c:v>38.6</c:v>
-                </c:pt>
-                <c:pt idx="2">
-                  <c:v>34.6</c:v>
-                </c:pt>
-                <c:pt idx="3">
-                  <c:v>31.6</c:v>
-                </c:pt>
-              </c:numCache>
-            </c:numRef>
-          </c:val>
-        </c:ser>
-        <c:ser>
-          <c:idx val="2"/>
-          <c:order val="2"/>
-          <c:tx>
-            <c:strRef>
-              <c:f>Blatt1!$D$1</c:f>
-              <c:strCache>
-                <c:ptCount val="1"/>
-                <c:pt idx="0">
-                  <c:v>Nord</c:v>
-                </c:pt>
-              </c:strCache>
-            </c:strRef>
-          </c:tx>
-          <c:invertIfNegative val="1"/>
-          <c:dLbls>
-            <c:numFmt formatCode="General" sourceLinked="0"/>
-            <c:spPr>
-              <a:noFill/>
-              <a:ln>
-                <a:noFill/>
-              </a:ln>
-              <a:effectLst/>
-            </c:spPr>
-            <c:showLegendKey val="1"/>
-            <c:showVal val="1"/>
-            <c:showCatName val="1"/>
-            <c:showSerName val="1"/>
-            <c:showPercent val="1"/>
-            <c:showBubbleSize val="1"/>
-            <c:showLeaderLines val="0"/>
-            <c:extLst>
-              <c:ext xmlns:c15="http://schemas.microsoft.com/office/drawing/2012/chart" uri="{CE6537A1-D6FC-4f65-9D91-7224C49458BB}">
-                <c15:layout/>
-                <c15:showLeaderLines val="0"/>
-              </c:ext>
-            </c:extLst>
-          </c:dLbls>
-          <c:cat>
-            <c:strRef>
-              <c:f>Blatt1!$A$2:$A$5</c:f>
-              <c:strCache>
-                <c:ptCount val="4"/>
-                <c:pt idx="0">
-                  <c:v>1. Qrtl.</c:v>
-                </c:pt>
-                <c:pt idx="1">
-                  <c:v>2. Qrtl.</c:v>
-                </c:pt>
-                <c:pt idx="2">
-                  <c:v>3. Qrtl.</c:v>
-                </c:pt>
-                <c:pt idx="3">
-                  <c:v>4. Qrtl.</c:v>
-                </c:pt>
-              </c:strCache>
-            </c:strRef>
-          </c:cat>
-          <c:val>
-            <c:numRef>
-              <c:f>Blatt1!$D$2:$D$5</c:f>
-              <c:numCache>
-                <c:formatCode>General</c:formatCode>
-                <c:ptCount val="4"/>
-                <c:pt idx="0">
-                  <c:v>45.9</c:v>
-                </c:pt>
-                <c:pt idx="1">
-                  <c:v>46.9</c:v>
-                </c:pt>
-                <c:pt idx="2">
-                  <c:v>45</c:v>
-                </c:pt>
-                <c:pt idx="3">
-                  <c:v>43.9</c:v>
-                </c:pt>
-              </c:numCache>
-            </c:numRef>
-          </c:val>
-        </c:ser>
-        <c:dLbls>
-          <c:showLegendKey val="0"/>
-          <c:showVal val="0"/>
-          <c:showCatName val="0"/>
-          <c:showSerName val="0"/>
-          <c:showPercent val="0"/>
-          <c:showBubbleSize val="0"/>
-        </c:dLbls>
-        <c:gapWidth val="150"/>
-        <c:overlap val="-25"/>
-        <c:axId val="1274189968"/>
-        <c:axId val="1274195408"/>
-      </c:barChart>
-      <c:catAx>
-        <c:axId val="1274189968"/>
-        <c:scaling>
-          <c:orientation val="minMax"/>
-        </c:scaling>
-        <c:delete val="1"/>
-        <c:axPos val="b"/>
-        <c:numFmt formatCode="General" sourceLinked="0"/>
-        <c:majorTickMark val="none"/>
-        <c:minorTickMark val="cross"/>
-        <c:tickLblPos val="nextTo"/>
-        <c:crossAx val="1274195408"/>
-        <c:crosses val="autoZero"/>
-        <c:auto val="1"/>
-        <c:lblAlgn val="ctr"/>
-        <c:lblOffset val="100"/>
-        <c:noMultiLvlLbl val="1"/>
-      </c:catAx>
-      <c:valAx>
-        <c:axId val="1274195408"/>
-        <c:scaling>
-          <c:orientation val="minMax"/>
-        </c:scaling>
-        <c:delete val="1"/>
-        <c:axPos val="l"/>
-        <c:numFmt formatCode="General" sourceLinked="1"/>
-        <c:majorTickMark val="cross"/>
-        <c:minorTickMark val="cross"/>
-        <c:tickLblPos val="nextTo"/>
-        <c:crossAx val="1274189968"/>
-        <c:crosses val="autoZero"/>
-        <c:crossBetween val="between"/>
-      </c:valAx>
-    </c:plotArea>
-    <c:legend>
-      <c:legendPos val="t"/>
-      <c:layout/>
-      <c:overlay val="1"/>
-    </c:legend>
-    <c:plotVisOnly val="1"/>
-    <c:dispBlanksAs val="zero"/>
-    <c:showDLblsOverMax val="1"/>
-  </c:chart>
-  <c:externalData r:id="rId1">
-    <c:autoUpdate val="0"/>
-  </c:externalData>
-</c:chartSpace>
 </file>
 
 <file path=ppt/notesMasters/notesMaster1.xml><?xml version="1.0" encoding="utf-8"?>
@@ -1330,6 +1016,184 @@
     <p:extLst>
       <p:ext uri="{BB962C8B-B14F-4D97-AF65-F5344CB8AC3E}">
         <p14:creationId xmlns:p14="http://schemas.microsoft.com/office/powerpoint/2010/main" val="3339219585"/>
+      </p:ext>
+    </p:extLst>
+  </p:cSld>
+  <p:clrMapOvr>
+    <a:masterClrMapping/>
+  </p:clrMapOvr>
+</p:notes>
+</file>
+
+<file path=ppt/notesSlides/notesSlide7.xml><?xml version="1.0" encoding="utf-8"?>
+<p:notes xmlns:a="http://schemas.openxmlformats.org/drawingml/2006/main" xmlns:r="http://schemas.openxmlformats.org/officeDocument/2006/relationships" xmlns:p="http://schemas.openxmlformats.org/presentationml/2006/main">
+  <p:cSld>
+    <p:spTree>
+      <p:nvGrpSpPr>
+        <p:cNvPr id="1" name=""/>
+        <p:cNvGrpSpPr/>
+        <p:nvPr/>
+      </p:nvGrpSpPr>
+      <p:grpSpPr>
+        <a:xfrm>
+          <a:off x="0" y="0"/>
+          <a:ext cx="0" cy="0"/>
+          <a:chOff x="0" y="0"/>
+          <a:chExt cx="0" cy="0"/>
+        </a:xfrm>
+      </p:grpSpPr>
+      <p:sp>
+        <p:nvSpPr>
+          <p:cNvPr id="2" name="Rectangle 1"/>
+          <p:cNvSpPr>
+            <a:spLocks noGrp="1" noRot="1" noChangeAspect="1"/>
+          </p:cNvSpPr>
+          <p:nvPr>
+            <p:ph type="sldImg"/>
+          </p:nvPr>
+        </p:nvSpPr>
+        <p:spPr/>
+      </p:sp>
+      <p:sp>
+        <p:nvSpPr>
+          <p:cNvPr id="3" name="Rectangle 2"/>
+          <p:cNvSpPr>
+            <a:spLocks noGrp="1"/>
+          </p:cNvSpPr>
+          <p:nvPr>
+            <p:ph type="body" idx="1"/>
+          </p:nvPr>
+        </p:nvSpPr>
+        <p:spPr/>
+        <p:txBody>
+          <a:bodyPr/>
+          <a:lstStyle>
+            <a:extLst/>
+          </a:lstStyle>
+          <a:p>
+            <a:endParaRPr lang="de-DE"/>
+          </a:p>
+        </p:txBody>
+      </p:sp>
+      <p:sp>
+        <p:nvSpPr>
+          <p:cNvPr id="4" name="Rectangle 3"/>
+          <p:cNvSpPr>
+            <a:spLocks noGrp="1"/>
+          </p:cNvSpPr>
+          <p:nvPr>
+            <p:ph type="sldNum" sz="quarter" idx="10"/>
+          </p:nvPr>
+        </p:nvSpPr>
+        <p:spPr/>
+        <p:txBody>
+          <a:bodyPr/>
+          <a:lstStyle>
+            <a:extLst/>
+          </a:lstStyle>
+          <a:p>
+            <a:fld id="{CA5D3BF3-D352-46FC-8343-31F56E6730EA}" type="slidenum">
+              <a:rPr lang="de-DE" smtClean="0"/>
+              <a:pPr/>
+              <a:t>7</a:t>
+            </a:fld>
+            <a:endParaRPr lang="de-DE"/>
+          </a:p>
+        </p:txBody>
+      </p:sp>
+    </p:spTree>
+    <p:extLst>
+      <p:ext uri="{BB962C8B-B14F-4D97-AF65-F5344CB8AC3E}">
+        <p14:creationId xmlns:p14="http://schemas.microsoft.com/office/powerpoint/2010/main" val="2925758054"/>
+      </p:ext>
+    </p:extLst>
+  </p:cSld>
+  <p:clrMapOvr>
+    <a:masterClrMapping/>
+  </p:clrMapOvr>
+</p:notes>
+</file>
+
+<file path=ppt/notesSlides/notesSlide8.xml><?xml version="1.0" encoding="utf-8"?>
+<p:notes xmlns:a="http://schemas.openxmlformats.org/drawingml/2006/main" xmlns:r="http://schemas.openxmlformats.org/officeDocument/2006/relationships" xmlns:p="http://schemas.openxmlformats.org/presentationml/2006/main">
+  <p:cSld>
+    <p:spTree>
+      <p:nvGrpSpPr>
+        <p:cNvPr id="1" name=""/>
+        <p:cNvGrpSpPr/>
+        <p:nvPr/>
+      </p:nvGrpSpPr>
+      <p:grpSpPr>
+        <a:xfrm>
+          <a:off x="0" y="0"/>
+          <a:ext cx="0" cy="0"/>
+          <a:chOff x="0" y="0"/>
+          <a:chExt cx="0" cy="0"/>
+        </a:xfrm>
+      </p:grpSpPr>
+      <p:sp>
+        <p:nvSpPr>
+          <p:cNvPr id="2" name="Rectangle 1"/>
+          <p:cNvSpPr>
+            <a:spLocks noGrp="1" noRot="1" noChangeAspect="1"/>
+          </p:cNvSpPr>
+          <p:nvPr>
+            <p:ph type="sldImg"/>
+          </p:nvPr>
+        </p:nvSpPr>
+        <p:spPr/>
+      </p:sp>
+      <p:sp>
+        <p:nvSpPr>
+          <p:cNvPr id="3" name="Rectangle 2"/>
+          <p:cNvSpPr>
+            <a:spLocks noGrp="1"/>
+          </p:cNvSpPr>
+          <p:nvPr>
+            <p:ph type="body" idx="1"/>
+          </p:nvPr>
+        </p:nvSpPr>
+        <p:spPr/>
+        <p:txBody>
+          <a:bodyPr/>
+          <a:lstStyle>
+            <a:extLst/>
+          </a:lstStyle>
+          <a:p>
+            <a:endParaRPr lang="de-DE"/>
+          </a:p>
+        </p:txBody>
+      </p:sp>
+      <p:sp>
+        <p:nvSpPr>
+          <p:cNvPr id="4" name="Rectangle 3"/>
+          <p:cNvSpPr>
+            <a:spLocks noGrp="1"/>
+          </p:cNvSpPr>
+          <p:nvPr>
+            <p:ph type="sldNum" sz="quarter" idx="10"/>
+          </p:nvPr>
+        </p:nvSpPr>
+        <p:spPr/>
+        <p:txBody>
+          <a:bodyPr/>
+          <a:lstStyle>
+            <a:extLst/>
+          </a:lstStyle>
+          <a:p>
+            <a:fld id="{CA5D3BF3-D352-46FC-8343-31F56E6730EA}" type="slidenum">
+              <a:rPr lang="de-DE" smtClean="0"/>
+              <a:pPr/>
+              <a:t>8</a:t>
+            </a:fld>
+            <a:endParaRPr lang="de-DE"/>
+          </a:p>
+        </p:txBody>
+      </p:sp>
+    </p:spTree>
+    <p:extLst>
+      <p:ext uri="{BB962C8B-B14F-4D97-AF65-F5344CB8AC3E}">
+        <p14:creationId xmlns:p14="http://schemas.microsoft.com/office/powerpoint/2010/main" val="1706849601"/>
       </p:ext>
     </p:extLst>
   </p:cSld>
@@ -4764,44 +4628,54 @@
         <p:spPr>
           <a:xfrm>
             <a:off x="609600" y="1352551"/>
-            <a:ext cx="5474568" cy="3163415"/>
+            <a:ext cx="6122640" cy="3163415"/>
           </a:xfrm>
         </p:spPr>
         <p:txBody>
           <a:bodyPr>
-            <a:normAutofit/>
+            <a:normAutofit lnSpcReduction="10000"/>
           </a:bodyPr>
           <a:lstStyle>
             <a:extLst/>
           </a:lstStyle>
           <a:p>
             <a:r>
+              <a:rPr lang="de-DE" smtClean="0"/>
+              <a:t>Klassendiagramme/FCM-Modell</a:t>
+            </a:r>
+            <a:endParaRPr lang="de-DE" dirty="0" smtClean="0"/>
+          </a:p>
+          <a:p>
+            <a:r>
               <a:rPr lang="de-DE" dirty="0" smtClean="0"/>
-              <a:t>Klassendiagramme</a:t>
-            </a:r>
-          </a:p>
-          <a:p>
-            <a:r>
-              <a:rPr lang="de-DE" dirty="0" smtClean="0"/>
-              <a:t> Verwendete Software</a:t>
-            </a:r>
+              <a:t>Verwendete Software/Framework</a:t>
+            </a:r>
+            <a:endParaRPr lang="de-DE" dirty="0" smtClean="0"/>
           </a:p>
           <a:p>
             <a:r>
               <a:rPr lang="de-DE" dirty="0" smtClean="0"/>
               <a:t>Codebeispiel</a:t>
             </a:r>
+            <a:endParaRPr lang="de-DE" dirty="0" smtClean="0"/>
           </a:p>
           <a:p>
             <a:r>
               <a:rPr lang="de-DE" dirty="0" smtClean="0"/>
-              <a:t>Grammatik</a:t>
-            </a:r>
+              <a:t>Grammatik/DSL</a:t>
+            </a:r>
+            <a:endParaRPr lang="de-DE" dirty="0" smtClean="0"/>
           </a:p>
           <a:p>
             <a:r>
               <a:rPr lang="de-DE" dirty="0" smtClean="0"/>
-              <a:t>Vorführung</a:t>
+              <a:t>Vorführung der App</a:t>
+            </a:r>
+          </a:p>
+          <a:p>
+            <a:r>
+              <a:rPr lang="de-DE" dirty="0" smtClean="0"/>
+              <a:t>Ausblick Dokumentation</a:t>
             </a:r>
             <a:endParaRPr lang="de-DE" dirty="0" smtClean="0"/>
           </a:p>
@@ -4863,65 +4737,9 @@
           </a:lstStyle>
           <a:p>
             <a:r>
-              <a:rPr lang="de-DE"/>
-              <a:t>Vorteile des Breitbildformats</a:t>
-            </a:r>
-          </a:p>
-        </p:txBody>
-      </p:sp>
-      <p:sp>
-        <p:nvSpPr>
-          <p:cNvPr id="3" name="Rectangle 2"/>
-          <p:cNvSpPr>
-            <a:spLocks noGrp="1"/>
-          </p:cNvSpPr>
-          <p:nvPr>
-            <p:ph sz="quarter" idx="13"/>
-          </p:nvPr>
-        </p:nvSpPr>
-        <p:spPr>
-          <a:xfrm>
-            <a:off x="609600" y="1200150"/>
-            <a:ext cx="3886200" cy="3200400"/>
-          </a:xfrm>
-        </p:spPr>
-        <p:txBody>
-          <a:bodyPr anchor="ctr"/>
-          <a:lstStyle>
-            <a:extLst/>
-          </a:lstStyle>
-          <a:p>
-            <a:pPr marL="274320" lvl="1"/>
-            <a:r>
-              <a:rPr lang="de-DE" sz="2400"/>
-              <a:t>Inhalte, die nebeneinander dargestellt werden, fügen sich besser ein. </a:t>
-            </a:r>
-            <a:endParaRPr lang="de-DE"/>
-          </a:p>
-          <a:p>
-            <a:pPr marL="274320" lvl="1"/>
-            <a:r>
-              <a:rPr lang="de-DE" sz="2400"/>
-              <a:t>Grafiken und Bilder können im Breitbildformat aussagekräftiger dargestellt werden.</a:t>
-            </a:r>
-          </a:p>
-        </p:txBody>
-      </p:sp>
-      <p:sp>
-        <p:nvSpPr>
-          <p:cNvPr id="4" name="Inhaltsplatzhalter 3"/>
-          <p:cNvSpPr>
-            <a:spLocks noGrp="1"/>
-          </p:cNvSpPr>
-          <p:nvPr>
-            <p:ph sz="quarter" idx="14"/>
-          </p:nvPr>
-        </p:nvSpPr>
-        <p:spPr/>
-        <p:txBody>
-          <a:bodyPr/>
-          <a:lstStyle/>
-          <a:p>
+              <a:rPr lang="de-DE" dirty="0" smtClean="0"/>
+              <a:t>Klassendiagramme</a:t>
+            </a:r>
             <a:endParaRPr lang="de-DE" dirty="0"/>
           </a:p>
         </p:txBody>
@@ -4983,65 +4801,13 @@
           </a:lstStyle>
           <a:p>
             <a:r>
-              <a:rPr lang="de-DE"/>
-              <a:t>Breitbildgrafiken</a:t>
-            </a:r>
-          </a:p>
-        </p:txBody>
-      </p:sp>
-      <p:sp>
-        <p:nvSpPr>
-          <p:cNvPr id="3" name="Rectangle 2"/>
-          <p:cNvSpPr>
-            <a:spLocks noGrp="1"/>
-          </p:cNvSpPr>
-          <p:nvPr>
-            <p:ph type="body" idx="1"/>
-          </p:nvPr>
-        </p:nvSpPr>
-        <p:spPr>
-          <a:xfrm>
-            <a:off x="609600" y="1504950"/>
-            <a:ext cx="1600200" cy="3067050"/>
-          </a:xfrm>
-        </p:spPr>
-        <p:txBody>
-          <a:bodyPr/>
-          <a:lstStyle>
-            <a:extLst/>
-          </a:lstStyle>
-          <a:p>
-            <a:r>
-              <a:rPr lang="de-DE" sz="1700"/>
-              <a:t> Sogar eine einzelne Grafik, wie ein Diagramm, kann im Breitbildformat aussagekräftiger dargestellt werden.</a:t>
-            </a:r>
-            <a:r>
-              <a:rPr lang="de-DE"/>
-              <a:t> </a:t>
-            </a:r>
-          </a:p>
-        </p:txBody>
-      </p:sp>
-      <p:graphicFrame>
-        <p:nvGraphicFramePr>
-          <p:cNvPr id="5" name="Content Placeholder 4"/>
-          <p:cNvGraphicFramePr>
-            <a:graphicFrameLocks noGrp="1"/>
-          </p:cNvGraphicFramePr>
-          <p:nvPr>
-            <p:ph sz="quarter" idx="13"/>
-          </p:nvPr>
-        </p:nvGraphicFramePr>
-        <p:xfrm>
-          <a:off x="2362200" y="1314450"/>
-          <a:ext cx="6400800" cy="3543300"/>
-        </p:xfrm>
-        <a:graphic>
-          <a:graphicData uri="http://schemas.openxmlformats.org/drawingml/2006/chart">
-            <c:chart xmlns:c="http://schemas.openxmlformats.org/drawingml/2006/chart" xmlns:r="http://schemas.openxmlformats.org/officeDocument/2006/relationships" r:id="rId3"/>
-          </a:graphicData>
-        </a:graphic>
-      </p:graphicFrame>
+              <a:rPr lang="de-DE" dirty="0" smtClean="0"/>
+              <a:t>Verwendete Software</a:t>
+            </a:r>
+            <a:endParaRPr lang="de-DE" dirty="0"/>
+          </a:p>
+        </p:txBody>
+      </p:sp>
     </p:spTree>
   </p:cSld>
   <p:clrMapOvr>
@@ -5092,187 +4858,10 @@
           </a:lstStyle>
           <a:p>
             <a:r>
-              <a:rPr lang="de-DE" sz="3400"/>
-              <a:t>Erstellen von Präsentationen im 16:9-Format</a:t>
-            </a:r>
-            <a:endParaRPr lang="de-DE"/>
-          </a:p>
-        </p:txBody>
-      </p:sp>
-      <p:sp>
-        <p:nvSpPr>
-          <p:cNvPr id="8" name="Rectangle 7"/>
-          <p:cNvSpPr/>
-          <p:nvPr/>
-        </p:nvSpPr>
-        <p:spPr>
-          <a:xfrm>
-            <a:off x="5029200" y="1809750"/>
-            <a:ext cx="3657600" cy="1558888"/>
-          </a:xfrm>
-          <a:prstGeom prst="rect">
-            <a:avLst/>
-          </a:prstGeom>
-        </p:spPr>
-        <p:style>
-          <a:lnRef idx="3">
-            <a:schemeClr val="lt1"/>
-          </a:lnRef>
-          <a:fillRef idx="1">
-            <a:schemeClr val="accent2"/>
-          </a:fillRef>
-          <a:effectRef idx="1">
-            <a:schemeClr val="accent2"/>
-          </a:effectRef>
-          <a:fontRef idx="minor">
-            <a:schemeClr val="lt1"/>
-          </a:fontRef>
-        </p:style>
-        <p:txBody>
-          <a:bodyPr wrap="square" lIns="182880" tIns="182880" rIns="182880" bIns="91440" rtlCol="0" anchor="ctr">
-            <a:spAutoFit/>
-          </a:bodyPr>
-          <a:lstStyle>
-            <a:extLst/>
-          </a:lstStyle>
-          <a:p>
-            <a:pPr>
-              <a:lnSpc>
-                <a:spcPct val="85000"/>
-              </a:lnSpc>
-            </a:pPr>
-            <a:r>
-              <a:rPr lang="de-DE" sz="1400" b="1">
-                <a:solidFill>
-                  <a:schemeClr val="bg1"/>
-                </a:solidFill>
-              </a:rPr>
-              <a:t>Wichtig: </a:t>
-            </a:r>
-            <a:r>
-              <a:rPr lang="de-DE" sz="1400">
-                <a:solidFill>
-                  <a:schemeClr val="bg1"/>
-                </a:solidFill>
-              </a:rPr>
-              <a:t>Beginnen Sie immer mit der Foliengröße und dem Seitenverhältnis, die Sie verwenden möchten. Wenn Sie die Foliengröße nach dem Erstellen einiger Folien ändern, wird die Größe der Bilder und anderer Grafiken geändert. Dies könnte möglicherweise ihr Aussehen verzerren.</a:t>
-            </a:r>
-          </a:p>
-          <a:p>
-            <a:pPr>
-              <a:lnSpc>
-                <a:spcPct val="85000"/>
-              </a:lnSpc>
-            </a:pPr>
-            <a:endParaRPr lang="de-DE" sz="1400">
-              <a:solidFill>
-                <a:schemeClr val="bg1"/>
-              </a:solidFill>
-            </a:endParaRPr>
-          </a:p>
-        </p:txBody>
-      </p:sp>
-      <p:sp>
-        <p:nvSpPr>
-          <p:cNvPr id="6" name="Rectangle 5"/>
-          <p:cNvSpPr>
-            <a:spLocks noGrp="1"/>
-          </p:cNvSpPr>
-          <p:nvPr>
-            <p:ph sz="quarter" idx="13"/>
-          </p:nvPr>
-        </p:nvSpPr>
-        <p:spPr>
-          <a:xfrm>
-            <a:off x="609600" y="1428751"/>
-            <a:ext cx="3962400" cy="3352799"/>
-          </a:xfrm>
-        </p:spPr>
-        <p:txBody>
-          <a:bodyPr>
-            <a:normAutofit fontScale="62500" lnSpcReduction="20000"/>
-          </a:bodyPr>
-          <a:lstStyle>
-            <a:extLst/>
-          </a:lstStyle>
-          <a:p>
-            <a:pPr marL="0" indent="0">
-              <a:buNone/>
-            </a:pPr>
-            <a:r>
-              <a:rPr lang="de-DE" sz="2400"/>
-              <a:t>Führen Sie eine der folgenden Aktionen aus, um eine Präsentation im Breitbildformat einzurichten:</a:t>
-            </a:r>
-          </a:p>
-          <a:p>
-            <a:pPr marL="274320" lvl="1"/>
-            <a:r>
-              <a:rPr lang="de-DE" sz="2600"/>
-              <a:t>Beginnen Sie mit dieser Vorlage. Löschen Sie die Beispielfolien einfach, und fügen Sie eigenen Inhalt hinzu.</a:t>
-            </a:r>
-          </a:p>
-          <a:p>
-            <a:pPr marL="274320" lvl="1"/>
-            <a:r>
-              <a:rPr lang="de-DE"/>
-              <a:t>Oder wechseln Sie zur Registerkarte </a:t>
-            </a:r>
-            <a:r>
-              <a:rPr lang="de-DE" b="1">
-                <a:solidFill>
-                  <a:schemeClr val="accent4"/>
-                </a:solidFill>
-              </a:rPr>
-              <a:t>Entwurf</a:t>
-            </a:r>
-            <a:r>
-              <a:rPr lang="de-DE"/>
-              <a:t>, und rufen Sie das Dialogfeld </a:t>
-            </a:r>
-            <a:r>
-              <a:rPr lang="de-DE" b="1">
-                <a:solidFill>
-                  <a:schemeClr val="accent4"/>
-                </a:solidFill>
-              </a:rPr>
-              <a:t>Seite einrichten </a:t>
-            </a:r>
-            <a:r>
-              <a:rPr lang="de-DE"/>
-              <a:t>auf. Klicken Sie auf das Dropdownfeld </a:t>
-            </a:r>
-            <a:r>
-              <a:rPr lang="de-DE" b="1">
-                <a:solidFill>
-                  <a:schemeClr val="accent4"/>
-                </a:solidFill>
-              </a:rPr>
-              <a:t>Foliengröße</a:t>
-            </a:r>
-            <a:r>
-              <a:rPr lang="de-DE">
-                <a:solidFill>
-                  <a:schemeClr val="accent4"/>
-                </a:solidFill>
-              </a:rPr>
-              <a:t> </a:t>
-            </a:r>
-            <a:r>
-              <a:rPr lang="de-DE"/>
-              <a:t>, und wählen Sie </a:t>
-            </a:r>
-            <a:r>
-              <a:rPr lang="de-DE" b="1">
-                <a:solidFill>
-                  <a:schemeClr val="accent4"/>
-                </a:solidFill>
-              </a:rPr>
-              <a:t>Bildschirmpräsentation (16:9) </a:t>
-            </a:r>
-            <a:r>
-              <a:rPr lang="de-DE"/>
-              <a:t>aus. (Beachten Sie, dass auch 16:10 unterstützt wird, eine häufig verwendete Breitbild-Laptopauflösung.)</a:t>
-            </a:r>
+              <a:rPr lang="de-DE" sz="3400" dirty="0" smtClean="0"/>
+              <a:t>Codebeispiel</a:t>
+            </a:r>
+            <a:endParaRPr lang="de-DE" dirty="0"/>
           </a:p>
         </p:txBody>
       </p:sp>
@@ -5326,98 +4915,138 @@
           </a:lstStyle>
           <a:p>
             <a:r>
-              <a:rPr lang="de-DE"/>
-              <a:t>Tipps zur Bildschirmpräsentation</a:t>
-            </a:r>
-          </a:p>
-        </p:txBody>
-      </p:sp>
-      <p:sp>
-        <p:nvSpPr>
-          <p:cNvPr id="4" name="Rectangle 3"/>
-          <p:cNvSpPr>
-            <a:spLocks noGrp="1"/>
-          </p:cNvSpPr>
-          <p:nvPr>
-            <p:ph sz="quarter" idx="14"/>
-          </p:nvPr>
-        </p:nvSpPr>
-        <p:spPr>
-          <a:xfrm>
-            <a:off x="4419600" y="1428750"/>
-            <a:ext cx="4495800" cy="3505200"/>
-          </a:xfrm>
-        </p:spPr>
-        <p:txBody>
-          <a:bodyPr>
-            <a:normAutofit fontScale="70000" lnSpcReduction="20000"/>
-          </a:bodyPr>
-          <a:lstStyle>
-            <a:extLst/>
-          </a:lstStyle>
-          <a:p>
-            <a:pPr marL="274320" lvl="1"/>
-            <a:r>
-              <a:rPr lang="de-DE"/>
-              <a:t>Für die Präsentation in echtem Breitbild benötigen Sie einen Computer und optional einen Projektor oder einen Flachbildschirm für die Ausgabe von Breitbildauflösungen.</a:t>
-            </a:r>
-          </a:p>
-          <a:p>
-            <a:pPr marL="274320" lvl="1"/>
-            <a:r>
-              <a:rPr lang="de-DE"/>
-              <a:t>Häufige Computerbreitbildauflösungen sind 1280 x 800 und 1440 x 900. (Diese haben ein Seitenverhältnis von 16:10, funktionieren aber mit 16:9-Projektoren und -Bildschirmen hervorragend.)</a:t>
-            </a:r>
-          </a:p>
-          <a:p>
-            <a:pPr marL="274320" lvl="1"/>
-            <a:r>
-              <a:rPr lang="de-DE"/>
-              <a:t>HD-Standardfernsehauflösungen sind 1280 x 720 und 1920 x 1080. </a:t>
-            </a:r>
-          </a:p>
-          <a:p>
-            <a:pPr marL="274320" lvl="1"/>
-            <a:r>
-              <a:rPr lang="de-DE"/>
-              <a:t>Verwenden Sie das Testmuster der nächsten Folie, um die Einstellungen Ihrer Bildschirmpräsentation zu prüfen.</a:t>
-            </a:r>
-          </a:p>
-          <a:p>
-            <a:pPr marL="274320"/>
-            <a:endParaRPr lang="de-DE"/>
-          </a:p>
-        </p:txBody>
-      </p:sp>
-      <p:pic>
-        <p:nvPicPr>
-          <p:cNvPr id="5" name="Rectangle 4"/>
-          <p:cNvPicPr>
-            <a:picLocks noChangeAspect="1"/>
-          </p:cNvPicPr>
-          <p:nvPr/>
-        </p:nvPicPr>
-        <p:blipFill>
-          <a:blip r:embed="rId3"/>
-          <a:stretch>
-            <a:fillRect/>
-          </a:stretch>
-        </p:blipFill>
-        <p:spPr>
-          <a:xfrm>
-            <a:off x="609600" y="1352550"/>
-            <a:ext cx="3581400" cy="2414427"/>
-          </a:xfrm>
-          <a:prstGeom prst="rect">
-            <a:avLst/>
-          </a:prstGeom>
-          <a:noFill/>
-          <a:ln>
-            <a:noFill/>
-          </a:ln>
-        </p:spPr>
-      </p:pic>
+              <a:rPr lang="de-DE" dirty="0" smtClean="0"/>
+              <a:t>Grammatik</a:t>
+            </a:r>
+            <a:endParaRPr lang="de-DE" dirty="0"/>
+          </a:p>
+        </p:txBody>
+      </p:sp>
     </p:spTree>
+  </p:cSld>
+  <p:clrMapOvr>
+    <a:masterClrMapping/>
+  </p:clrMapOvr>
+  <p:timing>
+    <p:tnLst>
+      <p:par>
+        <p:cTn id="1" dur="indefinite" restart="never" nodeType="tmRoot"/>
+      </p:par>
+    </p:tnLst>
+  </p:timing>
+</p:sld>
+</file>
+
+<file path=ppt/slides/slide7.xml><?xml version="1.0" encoding="utf-8"?>
+<p:sld xmlns:a="http://schemas.openxmlformats.org/drawingml/2006/main" xmlns:r="http://schemas.openxmlformats.org/officeDocument/2006/relationships" xmlns:p="http://schemas.openxmlformats.org/presentationml/2006/main">
+  <p:cSld>
+    <p:spTree>
+      <p:nvGrpSpPr>
+        <p:cNvPr id="1" name=""/>
+        <p:cNvGrpSpPr/>
+        <p:nvPr/>
+      </p:nvGrpSpPr>
+      <p:grpSpPr>
+        <a:xfrm>
+          <a:off x="0" y="0"/>
+          <a:ext cx="0" cy="0"/>
+          <a:chOff x="0" y="0"/>
+          <a:chExt cx="0" cy="0"/>
+        </a:xfrm>
+      </p:grpSpPr>
+      <p:sp>
+        <p:nvSpPr>
+          <p:cNvPr id="2" name="Rectangle 1"/>
+          <p:cNvSpPr>
+            <a:spLocks noGrp="1"/>
+          </p:cNvSpPr>
+          <p:nvPr>
+            <p:ph type="title"/>
+          </p:nvPr>
+        </p:nvSpPr>
+        <p:spPr/>
+        <p:txBody>
+          <a:bodyPr/>
+          <a:lstStyle>
+            <a:extLst/>
+          </a:lstStyle>
+          <a:p>
+            <a:r>
+              <a:rPr lang="de-DE" dirty="0" smtClean="0"/>
+              <a:t>Vorführung</a:t>
+            </a:r>
+            <a:endParaRPr lang="de-DE" dirty="0"/>
+          </a:p>
+        </p:txBody>
+      </p:sp>
+    </p:spTree>
+    <p:extLst>
+      <p:ext uri="{BB962C8B-B14F-4D97-AF65-F5344CB8AC3E}">
+        <p14:creationId xmlns:p14="http://schemas.microsoft.com/office/powerpoint/2010/main" val="1496001455"/>
+      </p:ext>
+    </p:extLst>
+  </p:cSld>
+  <p:clrMapOvr>
+    <a:masterClrMapping/>
+  </p:clrMapOvr>
+  <p:timing>
+    <p:tnLst>
+      <p:par>
+        <p:cTn id="1" dur="indefinite" restart="never" nodeType="tmRoot"/>
+      </p:par>
+    </p:tnLst>
+  </p:timing>
+</p:sld>
+</file>
+
+<file path=ppt/slides/slide8.xml><?xml version="1.0" encoding="utf-8"?>
+<p:sld xmlns:a="http://schemas.openxmlformats.org/drawingml/2006/main" xmlns:r="http://schemas.openxmlformats.org/officeDocument/2006/relationships" xmlns:p="http://schemas.openxmlformats.org/presentationml/2006/main">
+  <p:cSld>
+    <p:spTree>
+      <p:nvGrpSpPr>
+        <p:cNvPr id="1" name=""/>
+        <p:cNvGrpSpPr/>
+        <p:nvPr/>
+      </p:nvGrpSpPr>
+      <p:grpSpPr>
+        <a:xfrm>
+          <a:off x="0" y="0"/>
+          <a:ext cx="0" cy="0"/>
+          <a:chOff x="0" y="0"/>
+          <a:chExt cx="0" cy="0"/>
+        </a:xfrm>
+      </p:grpSpPr>
+      <p:sp>
+        <p:nvSpPr>
+          <p:cNvPr id="2" name="Rectangle 1"/>
+          <p:cNvSpPr>
+            <a:spLocks noGrp="1"/>
+          </p:cNvSpPr>
+          <p:nvPr>
+            <p:ph type="title"/>
+          </p:nvPr>
+        </p:nvSpPr>
+        <p:spPr/>
+        <p:txBody>
+          <a:bodyPr/>
+          <a:lstStyle>
+            <a:extLst/>
+          </a:lstStyle>
+          <a:p>
+            <a:r>
+              <a:rPr lang="de-DE" dirty="0" smtClean="0"/>
+              <a:t>Ausblick Dokumentation</a:t>
+            </a:r>
+            <a:endParaRPr lang="de-DE" dirty="0"/>
+          </a:p>
+        </p:txBody>
+      </p:sp>
+    </p:spTree>
+    <p:extLst>
+      <p:ext uri="{BB962C8B-B14F-4D97-AF65-F5344CB8AC3E}">
+        <p14:creationId xmlns:p14="http://schemas.microsoft.com/office/powerpoint/2010/main" val="2829802671"/>
+      </p:ext>
+    </p:extLst>
   </p:cSld>
   <p:clrMapOvr>
     <a:masterClrMapping/>

</xml_diff>